<commit_message>
formatierung des dokumentes, präsentation
</commit_message>
<xml_diff>
--- a/Präsentation_prototyp/Präsentation_prototyp_siai.pptx
+++ b/Präsentation_prototyp/Präsentation_prototyp_siai.pptx
@@ -164,7 +164,7 @@
           <a:noFill/>
           <a:extLst>
             <a:ext uri="{909E8E84-426E-40dd-AFC4-6F175D3DCCD1}">
-              <a14:hiddenFill xmlns="" xmlns:a14="http://schemas.microsoft.com/office/drawing/2010/main">
+              <a14:hiddenFill xmlns:a14="http://schemas.microsoft.com/office/drawing/2010/main" xmlns="">
                 <a:solidFill>
                   <a:srgbClr val="FFFFFF"/>
                 </a:solidFill>
@@ -224,7 +224,7 @@
             </a:ln>
             <a:extLst>
               <a:ext uri="{91240B29-F687-4f45-9708-019B960494DF}">
-                <a14:hiddenLine xmlns="" xmlns:a14="http://schemas.microsoft.com/office/drawing/2010/main" w="9525">
+                <a14:hiddenLine xmlns:a14="http://schemas.microsoft.com/office/drawing/2010/main" xmlns="" w="9525">
                   <a:solidFill>
                     <a:srgbClr val="000000"/>
                   </a:solidFill>
@@ -314,7 +314,7 @@
             </a:ln>
             <a:extLst>
               <a:ext uri="{91240B29-F687-4f45-9708-019B960494DF}">
-                <a14:hiddenLine xmlns="" xmlns:a14="http://schemas.microsoft.com/office/drawing/2010/main" w="9525">
+                <a14:hiddenLine xmlns:a14="http://schemas.microsoft.com/office/drawing/2010/main" xmlns="" w="9525">
                   <a:solidFill>
                     <a:srgbClr val="000000"/>
                   </a:solidFill>
@@ -404,7 +404,7 @@
             </a:ln>
             <a:extLst>
               <a:ext uri="{91240B29-F687-4f45-9708-019B960494DF}">
-                <a14:hiddenLine xmlns="" xmlns:a14="http://schemas.microsoft.com/office/drawing/2010/main" w="9525">
+                <a14:hiddenLine xmlns:a14="http://schemas.microsoft.com/office/drawing/2010/main" xmlns="" w="9525">
                   <a:solidFill>
                     <a:srgbClr val="000000"/>
                   </a:solidFill>
@@ -438,7 +438,7 @@
             </a:ln>
             <a:extLst>
               <a:ext uri="{91240B29-F687-4f45-9708-019B960494DF}">
-                <a14:hiddenLine xmlns="" xmlns:a14="http://schemas.microsoft.com/office/drawing/2010/main" w="9525">
+                <a14:hiddenLine xmlns:a14="http://schemas.microsoft.com/office/drawing/2010/main" xmlns="" w="9525">
                   <a:solidFill>
                     <a:srgbClr val="000000"/>
                   </a:solidFill>
@@ -528,7 +528,7 @@
             </a:ln>
             <a:extLst>
               <a:ext uri="{91240B29-F687-4f45-9708-019B960494DF}">
-                <a14:hiddenLine xmlns="" xmlns:a14="http://schemas.microsoft.com/office/drawing/2010/main" w="9525">
+                <a14:hiddenLine xmlns:a14="http://schemas.microsoft.com/office/drawing/2010/main" xmlns="" w="9525">
                   <a:solidFill>
                     <a:srgbClr val="000000"/>
                   </a:solidFill>
@@ -590,7 +590,7 @@
             </a:ln>
             <a:extLst>
               <a:ext uri="{91240B29-F687-4f45-9708-019B960494DF}">
-                <a14:hiddenLine xmlns="" xmlns:a14="http://schemas.microsoft.com/office/drawing/2010/main" w="9525">
+                <a14:hiddenLine xmlns:a14="http://schemas.microsoft.com/office/drawing/2010/main" xmlns="" w="9525">
                   <a:solidFill>
                     <a:srgbClr val="000000"/>
                   </a:solidFill>
@@ -652,7 +652,7 @@
             </a:ln>
             <a:extLst>
               <a:ext uri="{91240B29-F687-4f45-9708-019B960494DF}">
-                <a14:hiddenLine xmlns="" xmlns:a14="http://schemas.microsoft.com/office/drawing/2010/main" w="9525">
+                <a14:hiddenLine xmlns:a14="http://schemas.microsoft.com/office/drawing/2010/main" xmlns="" w="9525">
                   <a:solidFill>
                     <a:srgbClr val="000000"/>
                   </a:solidFill>
@@ -742,7 +742,7 @@
             </a:ln>
             <a:extLst>
               <a:ext uri="{91240B29-F687-4f45-9708-019B960494DF}">
-                <a14:hiddenLine xmlns="" xmlns:a14="http://schemas.microsoft.com/office/drawing/2010/main" w="9525">
+                <a14:hiddenLine xmlns:a14="http://schemas.microsoft.com/office/drawing/2010/main" xmlns="" w="9525">
                   <a:solidFill>
                     <a:srgbClr val="000000"/>
                   </a:solidFill>
@@ -804,7 +804,7 @@
             </a:ln>
             <a:extLst>
               <a:ext uri="{91240B29-F687-4f45-9708-019B960494DF}">
-                <a14:hiddenLine xmlns="" xmlns:a14="http://schemas.microsoft.com/office/drawing/2010/main" w="9525">
+                <a14:hiddenLine xmlns:a14="http://schemas.microsoft.com/office/drawing/2010/main" xmlns="" w="9525">
                   <a:solidFill>
                     <a:srgbClr val="000000"/>
                   </a:solidFill>
@@ -866,7 +866,7 @@
             </a:ln>
             <a:extLst>
               <a:ext uri="{91240B29-F687-4f45-9708-019B960494DF}">
-                <a14:hiddenLine xmlns="" xmlns:a14="http://schemas.microsoft.com/office/drawing/2010/main" w="9525">
+                <a14:hiddenLine xmlns:a14="http://schemas.microsoft.com/office/drawing/2010/main" xmlns="" w="9525">
                   <a:solidFill>
                     <a:srgbClr val="000000"/>
                   </a:solidFill>
@@ -956,7 +956,7 @@
             </a:ln>
             <a:extLst>
               <a:ext uri="{91240B29-F687-4f45-9708-019B960494DF}">
-                <a14:hiddenLine xmlns="" xmlns:a14="http://schemas.microsoft.com/office/drawing/2010/main" w="9525">
+                <a14:hiddenLine xmlns:a14="http://schemas.microsoft.com/office/drawing/2010/main" xmlns="" w="9525">
                   <a:solidFill>
                     <a:srgbClr val="000000"/>
                   </a:solidFill>
@@ -1046,7 +1046,7 @@
             </a:ln>
             <a:extLst>
               <a:ext uri="{91240B29-F687-4f45-9708-019B960494DF}">
-                <a14:hiddenLine xmlns="" xmlns:a14="http://schemas.microsoft.com/office/drawing/2010/main" w="9525">
+                <a14:hiddenLine xmlns:a14="http://schemas.microsoft.com/office/drawing/2010/main" xmlns="" w="9525">
                   <a:solidFill>
                     <a:srgbClr val="000000"/>
                   </a:solidFill>
@@ -1108,7 +1108,7 @@
             </a:ln>
             <a:extLst>
               <a:ext uri="{91240B29-F687-4f45-9708-019B960494DF}">
-                <a14:hiddenLine xmlns="" xmlns:a14="http://schemas.microsoft.com/office/drawing/2010/main" w="9525">
+                <a14:hiddenLine xmlns:a14="http://schemas.microsoft.com/office/drawing/2010/main" xmlns="" w="9525">
                   <a:solidFill>
                     <a:srgbClr val="000000"/>
                   </a:solidFill>
@@ -1218,7 +1218,7 @@
             </a:ln>
             <a:extLst>
               <a:ext uri="{91240B29-F687-4f45-9708-019B960494DF}">
-                <a14:hiddenLine xmlns="" xmlns:a14="http://schemas.microsoft.com/office/drawing/2010/main" w="9525">
+                <a14:hiddenLine xmlns:a14="http://schemas.microsoft.com/office/drawing/2010/main" xmlns="" w="9525">
                   <a:solidFill>
                     <a:srgbClr val="000000"/>
                   </a:solidFill>
@@ -1280,7 +1280,7 @@
             </a:ln>
             <a:extLst>
               <a:ext uri="{91240B29-F687-4f45-9708-019B960494DF}">
-                <a14:hiddenLine xmlns="" xmlns:a14="http://schemas.microsoft.com/office/drawing/2010/main" w="9525">
+                <a14:hiddenLine xmlns:a14="http://schemas.microsoft.com/office/drawing/2010/main" xmlns="" w="9525">
                   <a:solidFill>
                     <a:srgbClr val="000000"/>
                   </a:solidFill>
@@ -1370,7 +1370,7 @@
             </a:ln>
             <a:extLst>
               <a:ext uri="{91240B29-F687-4f45-9708-019B960494DF}">
-                <a14:hiddenLine xmlns="" xmlns:a14="http://schemas.microsoft.com/office/drawing/2010/main" w="9525">
+                <a14:hiddenLine xmlns:a14="http://schemas.microsoft.com/office/drawing/2010/main" xmlns="" w="9525">
                   <a:solidFill>
                     <a:srgbClr val="000000"/>
                   </a:solidFill>
@@ -1460,7 +1460,7 @@
             </a:ln>
             <a:extLst>
               <a:ext uri="{91240B29-F687-4f45-9708-019B960494DF}">
-                <a14:hiddenLine xmlns="" xmlns:a14="http://schemas.microsoft.com/office/drawing/2010/main" w="9525">
+                <a14:hiddenLine xmlns:a14="http://schemas.microsoft.com/office/drawing/2010/main" xmlns="" w="9525">
                   <a:solidFill>
                     <a:srgbClr val="000000"/>
                   </a:solidFill>
@@ -1522,7 +1522,7 @@
             </a:ln>
             <a:extLst>
               <a:ext uri="{91240B29-F687-4f45-9708-019B960494DF}">
-                <a14:hiddenLine xmlns="" xmlns:a14="http://schemas.microsoft.com/office/drawing/2010/main" w="9525">
+                <a14:hiddenLine xmlns:a14="http://schemas.microsoft.com/office/drawing/2010/main" xmlns="" w="9525">
                   <a:solidFill>
                     <a:srgbClr val="000000"/>
                   </a:solidFill>
@@ -1612,7 +1612,7 @@
             </a:ln>
             <a:extLst>
               <a:ext uri="{91240B29-F687-4f45-9708-019B960494DF}">
-                <a14:hiddenLine xmlns="" xmlns:a14="http://schemas.microsoft.com/office/drawing/2010/main" w="9525">
+                <a14:hiddenLine xmlns:a14="http://schemas.microsoft.com/office/drawing/2010/main" xmlns="" w="9525">
                   <a:solidFill>
                     <a:srgbClr val="000000"/>
                   </a:solidFill>
@@ -1702,7 +1702,7 @@
             </a:ln>
             <a:extLst>
               <a:ext uri="{91240B29-F687-4f45-9708-019B960494DF}">
-                <a14:hiddenLine xmlns="" xmlns:a14="http://schemas.microsoft.com/office/drawing/2010/main" w="9525">
+                <a14:hiddenLine xmlns:a14="http://schemas.microsoft.com/office/drawing/2010/main" xmlns="" w="9525">
                   <a:solidFill>
                     <a:srgbClr val="000000"/>
                   </a:solidFill>
@@ -1758,7 +1758,7 @@
             </a:ln>
             <a:extLst>
               <a:ext uri="{91240B29-F687-4f45-9708-019B960494DF}">
-                <a14:hiddenLine xmlns="" xmlns:a14="http://schemas.microsoft.com/office/drawing/2010/main" w="9525">
+                <a14:hiddenLine xmlns:a14="http://schemas.microsoft.com/office/drawing/2010/main" xmlns="" w="9525">
                   <a:solidFill>
                     <a:srgbClr val="000000"/>
                   </a:solidFill>
@@ -1848,7 +1848,7 @@
             </a:ln>
             <a:extLst>
               <a:ext uri="{91240B29-F687-4f45-9708-019B960494DF}">
-                <a14:hiddenLine xmlns="" xmlns:a14="http://schemas.microsoft.com/office/drawing/2010/main" w="9525">
+                <a14:hiddenLine xmlns:a14="http://schemas.microsoft.com/office/drawing/2010/main" xmlns="" w="9525">
                   <a:solidFill>
                     <a:srgbClr val="000000"/>
                   </a:solidFill>
@@ -1904,7 +1904,7 @@
             </a:ln>
             <a:extLst>
               <a:ext uri="{91240B29-F687-4f45-9708-019B960494DF}">
-                <a14:hiddenLine xmlns="" xmlns:a14="http://schemas.microsoft.com/office/drawing/2010/main" w="9525">
+                <a14:hiddenLine xmlns:a14="http://schemas.microsoft.com/office/drawing/2010/main" xmlns="" w="9525">
                   <a:solidFill>
                     <a:srgbClr val="000000"/>
                   </a:solidFill>
@@ -1994,7 +1994,7 @@
             </a:ln>
             <a:extLst>
               <a:ext uri="{91240B29-F687-4f45-9708-019B960494DF}">
-                <a14:hiddenLine xmlns="" xmlns:a14="http://schemas.microsoft.com/office/drawing/2010/main" w="9525">
+                <a14:hiddenLine xmlns:a14="http://schemas.microsoft.com/office/drawing/2010/main" xmlns="" w="9525">
                   <a:solidFill>
                     <a:srgbClr val="000000"/>
                   </a:solidFill>
@@ -2062,7 +2062,7 @@
             </a:ln>
             <a:extLst>
               <a:ext uri="{91240B29-F687-4f45-9708-019B960494DF}">
-                <a14:hiddenLine xmlns="" xmlns:a14="http://schemas.microsoft.com/office/drawing/2010/main" w="9525">
+                <a14:hiddenLine xmlns:a14="http://schemas.microsoft.com/office/drawing/2010/main" xmlns="" w="9525">
                   <a:solidFill>
                     <a:srgbClr val="000000"/>
                   </a:solidFill>
@@ -2152,7 +2152,7 @@
             </a:ln>
             <a:extLst>
               <a:ext uri="{91240B29-F687-4f45-9708-019B960494DF}">
-                <a14:hiddenLine xmlns="" xmlns:a14="http://schemas.microsoft.com/office/drawing/2010/main" w="9525">
+                <a14:hiddenLine xmlns:a14="http://schemas.microsoft.com/office/drawing/2010/main" xmlns="" w="9525">
                   <a:solidFill>
                     <a:srgbClr val="000000"/>
                   </a:solidFill>
@@ -2220,7 +2220,7 @@
             </a:ln>
             <a:extLst>
               <a:ext uri="{91240B29-F687-4f45-9708-019B960494DF}">
-                <a14:hiddenLine xmlns="" xmlns:a14="http://schemas.microsoft.com/office/drawing/2010/main" w="9525">
+                <a14:hiddenLine xmlns:a14="http://schemas.microsoft.com/office/drawing/2010/main" xmlns="" w="9525">
                   <a:solidFill>
                     <a:srgbClr val="000000"/>
                   </a:solidFill>
@@ -2310,7 +2310,7 @@
             </a:ln>
             <a:extLst>
               <a:ext uri="{91240B29-F687-4f45-9708-019B960494DF}">
-                <a14:hiddenLine xmlns="" xmlns:a14="http://schemas.microsoft.com/office/drawing/2010/main" w="9525">
+                <a14:hiddenLine xmlns:a14="http://schemas.microsoft.com/office/drawing/2010/main" xmlns="" w="9525">
                   <a:solidFill>
                     <a:srgbClr val="000000"/>
                   </a:solidFill>
@@ -2344,7 +2344,7 @@
             </a:ln>
             <a:extLst>
               <a:ext uri="{91240B29-F687-4f45-9708-019B960494DF}">
-                <a14:hiddenLine xmlns="" xmlns:a14="http://schemas.microsoft.com/office/drawing/2010/main" w="9525">
+                <a14:hiddenLine xmlns:a14="http://schemas.microsoft.com/office/drawing/2010/main" xmlns="" w="9525">
                   <a:solidFill>
                     <a:srgbClr val="000000"/>
                   </a:solidFill>
@@ -2434,7 +2434,7 @@
             </a:ln>
             <a:extLst>
               <a:ext uri="{91240B29-F687-4f45-9708-019B960494DF}">
-                <a14:hiddenLine xmlns="" xmlns:a14="http://schemas.microsoft.com/office/drawing/2010/main" w="9525">
+                <a14:hiddenLine xmlns:a14="http://schemas.microsoft.com/office/drawing/2010/main" xmlns="" w="9525">
                   <a:solidFill>
                     <a:srgbClr val="000000"/>
                   </a:solidFill>
@@ -2496,7 +2496,7 @@
             </a:ln>
             <a:extLst>
               <a:ext uri="{91240B29-F687-4f45-9708-019B960494DF}">
-                <a14:hiddenLine xmlns="" xmlns:a14="http://schemas.microsoft.com/office/drawing/2010/main" w="9525">
+                <a14:hiddenLine xmlns:a14="http://schemas.microsoft.com/office/drawing/2010/main" xmlns="" w="9525">
                   <a:solidFill>
                     <a:srgbClr val="000000"/>
                   </a:solidFill>
@@ -2558,7 +2558,7 @@
             </a:ln>
             <a:extLst>
               <a:ext uri="{91240B29-F687-4f45-9708-019B960494DF}">
-                <a14:hiddenLine xmlns="" xmlns:a14="http://schemas.microsoft.com/office/drawing/2010/main" w="9525">
+                <a14:hiddenLine xmlns:a14="http://schemas.microsoft.com/office/drawing/2010/main" xmlns="" w="9525">
                   <a:solidFill>
                     <a:srgbClr val="000000"/>
                   </a:solidFill>
@@ -2648,7 +2648,7 @@
             </a:ln>
             <a:extLst>
               <a:ext uri="{91240B29-F687-4f45-9708-019B960494DF}">
-                <a14:hiddenLine xmlns="" xmlns:a14="http://schemas.microsoft.com/office/drawing/2010/main" w="9525">
+                <a14:hiddenLine xmlns:a14="http://schemas.microsoft.com/office/drawing/2010/main" xmlns="" w="9525">
                   <a:solidFill>
                     <a:srgbClr val="000000"/>
                   </a:solidFill>
@@ -2716,7 +2716,7 @@
             </a:ln>
             <a:extLst>
               <a:ext uri="{91240B29-F687-4f45-9708-019B960494DF}">
-                <a14:hiddenLine xmlns="" xmlns:a14="http://schemas.microsoft.com/office/drawing/2010/main" w="9525">
+                <a14:hiddenLine xmlns:a14="http://schemas.microsoft.com/office/drawing/2010/main" xmlns="" w="9525">
                   <a:solidFill>
                     <a:srgbClr val="000000"/>
                   </a:solidFill>
@@ -2778,7 +2778,7 @@
             </a:ln>
             <a:extLst>
               <a:ext uri="{91240B29-F687-4f45-9708-019B960494DF}">
-                <a14:hiddenLine xmlns="" xmlns:a14="http://schemas.microsoft.com/office/drawing/2010/main" w="9525">
+                <a14:hiddenLine xmlns:a14="http://schemas.microsoft.com/office/drawing/2010/main" xmlns="" w="9525">
                   <a:solidFill>
                     <a:srgbClr val="000000"/>
                   </a:solidFill>
@@ -2868,7 +2868,7 @@
             </a:ln>
             <a:extLst>
               <a:ext uri="{91240B29-F687-4f45-9708-019B960494DF}">
-                <a14:hiddenLine xmlns="" xmlns:a14="http://schemas.microsoft.com/office/drawing/2010/main" w="9525">
+                <a14:hiddenLine xmlns:a14="http://schemas.microsoft.com/office/drawing/2010/main" xmlns="" w="9525">
                   <a:solidFill>
                     <a:srgbClr val="000000"/>
                   </a:solidFill>
@@ -2930,7 +2930,7 @@
             </a:ln>
             <a:extLst>
               <a:ext uri="{91240B29-F687-4f45-9708-019B960494DF}">
-                <a14:hiddenLine xmlns="" xmlns:a14="http://schemas.microsoft.com/office/drawing/2010/main" w="9525">
+                <a14:hiddenLine xmlns:a14="http://schemas.microsoft.com/office/drawing/2010/main" xmlns="" w="9525">
                   <a:solidFill>
                     <a:srgbClr val="000000"/>
                   </a:solidFill>
@@ -3020,7 +3020,7 @@
             </a:ln>
             <a:extLst>
               <a:ext uri="{91240B29-F687-4f45-9708-019B960494DF}">
-                <a14:hiddenLine xmlns="" xmlns:a14="http://schemas.microsoft.com/office/drawing/2010/main" w="9525">
+                <a14:hiddenLine xmlns:a14="http://schemas.microsoft.com/office/drawing/2010/main" xmlns="" w="9525">
                   <a:solidFill>
                     <a:srgbClr val="000000"/>
                   </a:solidFill>
@@ -3082,7 +3082,7 @@
             </a:ln>
             <a:extLst>
               <a:ext uri="{91240B29-F687-4f45-9708-019B960494DF}">
-                <a14:hiddenLine xmlns="" xmlns:a14="http://schemas.microsoft.com/office/drawing/2010/main" w="9525">
+                <a14:hiddenLine xmlns:a14="http://schemas.microsoft.com/office/drawing/2010/main" xmlns="" w="9525">
                   <a:solidFill>
                     <a:srgbClr val="000000"/>
                   </a:solidFill>
@@ -3172,7 +3172,7 @@
             </a:ln>
             <a:extLst>
               <a:ext uri="{91240B29-F687-4f45-9708-019B960494DF}">
-                <a14:hiddenLine xmlns="" xmlns:a14="http://schemas.microsoft.com/office/drawing/2010/main" w="9525">
+                <a14:hiddenLine xmlns:a14="http://schemas.microsoft.com/office/drawing/2010/main" xmlns="" w="9525">
                   <a:solidFill>
                     <a:srgbClr val="000000"/>
                   </a:solidFill>
@@ -3206,7 +3206,7 @@
             </a:ln>
             <a:extLst>
               <a:ext uri="{91240B29-F687-4f45-9708-019B960494DF}">
-                <a14:hiddenLine xmlns="" xmlns:a14="http://schemas.microsoft.com/office/drawing/2010/main" w="9525">
+                <a14:hiddenLine xmlns:a14="http://schemas.microsoft.com/office/drawing/2010/main" xmlns="" w="9525">
                   <a:solidFill>
                     <a:srgbClr val="000000"/>
                   </a:solidFill>
@@ -3271,7 +3271,7 @@
             </a:ln>
             <a:extLst>
               <a:ext uri="{91240B29-F687-4f45-9708-019B960494DF}">
-                <a14:hiddenLine xmlns="" xmlns:a14="http://schemas.microsoft.com/office/drawing/2010/main" w="9525">
+                <a14:hiddenLine xmlns:a14="http://schemas.microsoft.com/office/drawing/2010/main" xmlns="" w="9525">
                   <a:solidFill>
                     <a:srgbClr val="000000"/>
                   </a:solidFill>
@@ -3361,7 +3361,7 @@
             </a:ln>
             <a:extLst>
               <a:ext uri="{91240B29-F687-4f45-9708-019B960494DF}">
-                <a14:hiddenLine xmlns="" xmlns:a14="http://schemas.microsoft.com/office/drawing/2010/main" w="9525">
+                <a14:hiddenLine xmlns:a14="http://schemas.microsoft.com/office/drawing/2010/main" xmlns="" w="9525">
                   <a:solidFill>
                     <a:srgbClr val="000000"/>
                   </a:solidFill>
@@ -3423,7 +3423,7 @@
             </a:ln>
             <a:extLst>
               <a:ext uri="{91240B29-F687-4f45-9708-019B960494DF}">
-                <a14:hiddenLine xmlns="" xmlns:a14="http://schemas.microsoft.com/office/drawing/2010/main" w="9525">
+                <a14:hiddenLine xmlns:a14="http://schemas.microsoft.com/office/drawing/2010/main" xmlns="" w="9525">
                   <a:solidFill>
                     <a:srgbClr val="000000"/>
                   </a:solidFill>
@@ -3513,7 +3513,7 @@
             </a:ln>
             <a:extLst>
               <a:ext uri="{91240B29-F687-4f45-9708-019B960494DF}">
-                <a14:hiddenLine xmlns="" xmlns:a14="http://schemas.microsoft.com/office/drawing/2010/main" w="9525">
+                <a14:hiddenLine xmlns:a14="http://schemas.microsoft.com/office/drawing/2010/main" xmlns="" w="9525">
                   <a:solidFill>
                     <a:srgbClr val="000000"/>
                   </a:solidFill>
@@ -3603,7 +3603,7 @@
             </a:ln>
             <a:extLst>
               <a:ext uri="{91240B29-F687-4f45-9708-019B960494DF}">
-                <a14:hiddenLine xmlns="" xmlns:a14="http://schemas.microsoft.com/office/drawing/2010/main" w="9525">
+                <a14:hiddenLine xmlns:a14="http://schemas.microsoft.com/office/drawing/2010/main" xmlns="" w="9525">
                   <a:solidFill>
                     <a:srgbClr val="000000"/>
                   </a:solidFill>
@@ -3668,7 +3668,7 @@
             </a:ln>
             <a:extLst>
               <a:ext uri="{91240B29-F687-4f45-9708-019B960494DF}">
-                <a14:hiddenLine xmlns="" xmlns:a14="http://schemas.microsoft.com/office/drawing/2010/main" w="9525">
+                <a14:hiddenLine xmlns:a14="http://schemas.microsoft.com/office/drawing/2010/main" xmlns="" w="9525">
                   <a:solidFill>
                     <a:srgbClr val="000000"/>
                   </a:solidFill>
@@ -3730,7 +3730,7 @@
             </a:ln>
             <a:extLst>
               <a:ext uri="{91240B29-F687-4f45-9708-019B960494DF}">
-                <a14:hiddenLine xmlns="" xmlns:a14="http://schemas.microsoft.com/office/drawing/2010/main" w="9525">
+                <a14:hiddenLine xmlns:a14="http://schemas.microsoft.com/office/drawing/2010/main" xmlns="" w="9525">
                   <a:solidFill>
                     <a:srgbClr val="000000"/>
                   </a:solidFill>
@@ -3820,7 +3820,7 @@
             </a:ln>
             <a:extLst>
               <a:ext uri="{91240B29-F687-4f45-9708-019B960494DF}">
-                <a14:hiddenLine xmlns="" xmlns:a14="http://schemas.microsoft.com/office/drawing/2010/main" w="9525">
+                <a14:hiddenLine xmlns:a14="http://schemas.microsoft.com/office/drawing/2010/main" xmlns="" w="9525">
                   <a:solidFill>
                     <a:srgbClr val="000000"/>
                   </a:solidFill>
@@ -3910,7 +3910,7 @@
             </a:ln>
             <a:extLst>
               <a:ext uri="{91240B29-F687-4f45-9708-019B960494DF}">
-                <a14:hiddenLine xmlns="" xmlns:a14="http://schemas.microsoft.com/office/drawing/2010/main" w="9525">
+                <a14:hiddenLine xmlns:a14="http://schemas.microsoft.com/office/drawing/2010/main" xmlns="" w="9525">
                   <a:solidFill>
                     <a:srgbClr val="000000"/>
                   </a:solidFill>
@@ -3972,7 +3972,7 @@
             </a:ln>
             <a:extLst>
               <a:ext uri="{91240B29-F687-4f45-9708-019B960494DF}">
-                <a14:hiddenLine xmlns="" xmlns:a14="http://schemas.microsoft.com/office/drawing/2010/main" w="9525">
+                <a14:hiddenLine xmlns:a14="http://schemas.microsoft.com/office/drawing/2010/main" xmlns="" w="9525">
                   <a:solidFill>
                     <a:srgbClr val="000000"/>
                   </a:solidFill>
@@ -4092,7 +4092,7 @@
             </a:ln>
             <a:extLst>
               <a:ext uri="{91240B29-F687-4f45-9708-019B960494DF}">
-                <a14:hiddenLine xmlns="" xmlns:a14="http://schemas.microsoft.com/office/drawing/2010/main" w="9525">
+                <a14:hiddenLine xmlns:a14="http://schemas.microsoft.com/office/drawing/2010/main" xmlns="" w="9525">
                   <a:solidFill>
                     <a:srgbClr val="000000"/>
                   </a:solidFill>
@@ -4160,7 +4160,7 @@
             </a:ln>
             <a:extLst>
               <a:ext uri="{91240B29-F687-4f45-9708-019B960494DF}">
-                <a14:hiddenLine xmlns="" xmlns:a14="http://schemas.microsoft.com/office/drawing/2010/main" w="9525">
+                <a14:hiddenLine xmlns:a14="http://schemas.microsoft.com/office/drawing/2010/main" xmlns="" w="9525">
                   <a:solidFill>
                     <a:srgbClr val="000000"/>
                   </a:solidFill>
@@ -4250,7 +4250,7 @@
             </a:ln>
             <a:extLst>
               <a:ext uri="{91240B29-F687-4f45-9708-019B960494DF}">
-                <a14:hiddenLine xmlns="" xmlns:a14="http://schemas.microsoft.com/office/drawing/2010/main" w="9525">
+                <a14:hiddenLine xmlns:a14="http://schemas.microsoft.com/office/drawing/2010/main" xmlns="" w="9525">
                   <a:solidFill>
                     <a:srgbClr val="000000"/>
                   </a:solidFill>
@@ -8972,7 +8972,7 @@
           <a:noFill/>
           <a:extLst>
             <a:ext uri="{909E8E84-426E-40dd-AFC4-6F175D3DCCD1}">
-              <a14:hiddenFill xmlns="" xmlns:a14="http://schemas.microsoft.com/office/drawing/2010/main">
+              <a14:hiddenFill xmlns:a14="http://schemas.microsoft.com/office/drawing/2010/main" xmlns="">
                 <a:solidFill>
                   <a:srgbClr val="FFFFFF"/>
                 </a:solidFill>
@@ -9046,7 +9046,7 @@
               </a:ln>
               <a:extLst>
                 <a:ext uri="{91240B29-F687-4f45-9708-019B960494DF}">
-                  <a14:hiddenLine xmlns="" xmlns:a14="http://schemas.microsoft.com/office/drawing/2010/main" w="9525">
+                  <a14:hiddenLine xmlns:a14="http://schemas.microsoft.com/office/drawing/2010/main" xmlns="" w="9525">
                     <a:solidFill>
                       <a:srgbClr val="000000"/>
                     </a:solidFill>
@@ -9136,7 +9136,7 @@
               </a:ln>
               <a:extLst>
                 <a:ext uri="{91240B29-F687-4f45-9708-019B960494DF}">
-                  <a14:hiddenLine xmlns="" xmlns:a14="http://schemas.microsoft.com/office/drawing/2010/main" w="9525">
+                  <a14:hiddenLine xmlns:a14="http://schemas.microsoft.com/office/drawing/2010/main" xmlns="" w="9525">
                     <a:solidFill>
                       <a:srgbClr val="000000"/>
                     </a:solidFill>
@@ -9226,7 +9226,7 @@
               </a:ln>
               <a:extLst>
                 <a:ext uri="{91240B29-F687-4f45-9708-019B960494DF}">
-                  <a14:hiddenLine xmlns="" xmlns:a14="http://schemas.microsoft.com/office/drawing/2010/main" w="9525">
+                  <a14:hiddenLine xmlns:a14="http://schemas.microsoft.com/office/drawing/2010/main" xmlns="" w="9525">
                     <a:solidFill>
                       <a:srgbClr val="000000"/>
                     </a:solidFill>
@@ -9288,7 +9288,7 @@
               </a:ln>
               <a:extLst>
                 <a:ext uri="{91240B29-F687-4f45-9708-019B960494DF}">
-                  <a14:hiddenLine xmlns="" xmlns:a14="http://schemas.microsoft.com/office/drawing/2010/main" w="9525">
+                  <a14:hiddenLine xmlns:a14="http://schemas.microsoft.com/office/drawing/2010/main" xmlns="" w="9525">
                     <a:solidFill>
                       <a:srgbClr val="000000"/>
                     </a:solidFill>
@@ -9378,7 +9378,7 @@
               </a:ln>
               <a:extLst>
                 <a:ext uri="{91240B29-F687-4f45-9708-019B960494DF}">
-                  <a14:hiddenLine xmlns="" xmlns:a14="http://schemas.microsoft.com/office/drawing/2010/main" w="9525">
+                  <a14:hiddenLine xmlns:a14="http://schemas.microsoft.com/office/drawing/2010/main" xmlns="" w="9525">
                     <a:solidFill>
                       <a:srgbClr val="000000"/>
                     </a:solidFill>
@@ -9440,7 +9440,7 @@
               </a:ln>
               <a:extLst>
                 <a:ext uri="{91240B29-F687-4f45-9708-019B960494DF}">
-                  <a14:hiddenLine xmlns="" xmlns:a14="http://schemas.microsoft.com/office/drawing/2010/main" w="9525">
+                  <a14:hiddenLine xmlns:a14="http://schemas.microsoft.com/office/drawing/2010/main" xmlns="" w="9525">
                     <a:solidFill>
                       <a:srgbClr val="000000"/>
                     </a:solidFill>
@@ -9502,7 +9502,7 @@
               </a:ln>
               <a:extLst>
                 <a:ext uri="{91240B29-F687-4f45-9708-019B960494DF}">
-                  <a14:hiddenLine xmlns="" xmlns:a14="http://schemas.microsoft.com/office/drawing/2010/main" w="9525">
+                  <a14:hiddenLine xmlns:a14="http://schemas.microsoft.com/office/drawing/2010/main" xmlns="" w="9525">
                     <a:solidFill>
                       <a:srgbClr val="000000"/>
                     </a:solidFill>
@@ -9592,7 +9592,7 @@
               </a:ln>
               <a:extLst>
                 <a:ext uri="{91240B29-F687-4f45-9708-019B960494DF}">
-                  <a14:hiddenLine xmlns="" xmlns:a14="http://schemas.microsoft.com/office/drawing/2010/main" w="9525">
+                  <a14:hiddenLine xmlns:a14="http://schemas.microsoft.com/office/drawing/2010/main" xmlns="" w="9525">
                     <a:solidFill>
                       <a:srgbClr val="000000"/>
                     </a:solidFill>
@@ -9682,7 +9682,7 @@
               </a:ln>
               <a:extLst>
                 <a:ext uri="{91240B29-F687-4f45-9708-019B960494DF}">
-                  <a14:hiddenLine xmlns="" xmlns:a14="http://schemas.microsoft.com/office/drawing/2010/main" w="9525">
+                  <a14:hiddenLine xmlns:a14="http://schemas.microsoft.com/office/drawing/2010/main" xmlns="" w="9525">
                     <a:solidFill>
                       <a:srgbClr val="000000"/>
                     </a:solidFill>
@@ -9744,7 +9744,7 @@
               </a:ln>
               <a:extLst>
                 <a:ext uri="{91240B29-F687-4f45-9708-019B960494DF}">
-                  <a14:hiddenLine xmlns="" xmlns:a14="http://schemas.microsoft.com/office/drawing/2010/main" w="9525">
+                  <a14:hiddenLine xmlns:a14="http://schemas.microsoft.com/office/drawing/2010/main" xmlns="" w="9525">
                     <a:solidFill>
                       <a:srgbClr val="000000"/>
                     </a:solidFill>
@@ -9854,7 +9854,7 @@
               </a:ln>
               <a:extLst>
                 <a:ext uri="{91240B29-F687-4f45-9708-019B960494DF}">
-                  <a14:hiddenLine xmlns="" xmlns:a14="http://schemas.microsoft.com/office/drawing/2010/main" w="9525">
+                  <a14:hiddenLine xmlns:a14="http://schemas.microsoft.com/office/drawing/2010/main" xmlns="" w="9525">
                     <a:solidFill>
                       <a:srgbClr val="000000"/>
                     </a:solidFill>
@@ -9938,7 +9938,7 @@
               </a:ln>
               <a:extLst>
                 <a:ext uri="{91240B29-F687-4f45-9708-019B960494DF}">
-                  <a14:hiddenLine xmlns="" xmlns:a14="http://schemas.microsoft.com/office/drawing/2010/main" w="9525">
+                  <a14:hiddenLine xmlns:a14="http://schemas.microsoft.com/office/drawing/2010/main" xmlns="" w="9525">
                     <a:solidFill>
                       <a:srgbClr val="000000"/>
                     </a:solidFill>
@@ -10000,7 +10000,7 @@
               </a:ln>
               <a:extLst>
                 <a:ext uri="{91240B29-F687-4f45-9708-019B960494DF}">
-                  <a14:hiddenLine xmlns="" xmlns:a14="http://schemas.microsoft.com/office/drawing/2010/main" w="9525">
+                  <a14:hiddenLine xmlns:a14="http://schemas.microsoft.com/office/drawing/2010/main" xmlns="" w="9525">
                     <a:solidFill>
                       <a:srgbClr val="000000"/>
                     </a:solidFill>
@@ -10062,7 +10062,7 @@
               </a:ln>
               <a:extLst>
                 <a:ext uri="{91240B29-F687-4f45-9708-019B960494DF}">
-                  <a14:hiddenLine xmlns="" xmlns:a14="http://schemas.microsoft.com/office/drawing/2010/main" w="9525">
+                  <a14:hiddenLine xmlns:a14="http://schemas.microsoft.com/office/drawing/2010/main" xmlns="" w="9525">
                     <a:solidFill>
                       <a:srgbClr val="000000"/>
                     </a:solidFill>
@@ -10152,7 +10152,7 @@
               </a:ln>
               <a:extLst>
                 <a:ext uri="{91240B29-F687-4f45-9708-019B960494DF}">
-                  <a14:hiddenLine xmlns="" xmlns:a14="http://schemas.microsoft.com/office/drawing/2010/main" w="9525">
+                  <a14:hiddenLine xmlns:a14="http://schemas.microsoft.com/office/drawing/2010/main" xmlns="" w="9525">
                     <a:solidFill>
                       <a:srgbClr val="000000"/>
                     </a:solidFill>
@@ -10186,7 +10186,7 @@
               </a:ln>
               <a:extLst>
                 <a:ext uri="{91240B29-F687-4f45-9708-019B960494DF}">
-                  <a14:hiddenLine xmlns="" xmlns:a14="http://schemas.microsoft.com/office/drawing/2010/main" w="9525">
+                  <a14:hiddenLine xmlns:a14="http://schemas.microsoft.com/office/drawing/2010/main" xmlns="" w="9525">
                     <a:solidFill>
                       <a:srgbClr val="000000"/>
                     </a:solidFill>
@@ -10251,7 +10251,7 @@
               </a:ln>
               <a:extLst>
                 <a:ext uri="{91240B29-F687-4f45-9708-019B960494DF}">
-                  <a14:hiddenLine xmlns="" xmlns:a14="http://schemas.microsoft.com/office/drawing/2010/main" w="9525">
+                  <a14:hiddenLine xmlns:a14="http://schemas.microsoft.com/office/drawing/2010/main" xmlns="" w="9525">
                     <a:solidFill>
                       <a:srgbClr val="000000"/>
                     </a:solidFill>
@@ -10341,7 +10341,7 @@
               </a:ln>
               <a:extLst>
                 <a:ext uri="{91240B29-F687-4f45-9708-019B960494DF}">
-                  <a14:hiddenLine xmlns="" xmlns:a14="http://schemas.microsoft.com/office/drawing/2010/main" w="9525">
+                  <a14:hiddenLine xmlns:a14="http://schemas.microsoft.com/office/drawing/2010/main" xmlns="" w="9525">
                     <a:solidFill>
                       <a:srgbClr val="000000"/>
                     </a:solidFill>
@@ -10403,7 +10403,7 @@
               </a:ln>
               <a:extLst>
                 <a:ext uri="{91240B29-F687-4f45-9708-019B960494DF}">
-                  <a14:hiddenLine xmlns="" xmlns:a14="http://schemas.microsoft.com/office/drawing/2010/main" w="9525">
+                  <a14:hiddenLine xmlns:a14="http://schemas.microsoft.com/office/drawing/2010/main" xmlns="" w="9525">
                     <a:solidFill>
                       <a:srgbClr val="000000"/>
                     </a:solidFill>
@@ -10493,7 +10493,7 @@
               </a:ln>
               <a:extLst>
                 <a:ext uri="{91240B29-F687-4f45-9708-019B960494DF}">
-                  <a14:hiddenLine xmlns="" xmlns:a14="http://schemas.microsoft.com/office/drawing/2010/main" w="9525">
+                  <a14:hiddenLine xmlns:a14="http://schemas.microsoft.com/office/drawing/2010/main" xmlns="" w="9525">
                     <a:solidFill>
                       <a:srgbClr val="000000"/>
                     </a:solidFill>
@@ -10558,7 +10558,7 @@
               </a:ln>
               <a:extLst>
                 <a:ext uri="{91240B29-F687-4f45-9708-019B960494DF}">
-                  <a14:hiddenLine xmlns="" xmlns:a14="http://schemas.microsoft.com/office/drawing/2010/main" w="9525">
+                  <a14:hiddenLine xmlns:a14="http://schemas.microsoft.com/office/drawing/2010/main" xmlns="" w="9525">
                     <a:solidFill>
                       <a:srgbClr val="000000"/>
                     </a:solidFill>
@@ -10620,7 +10620,7 @@
               </a:ln>
               <a:extLst>
                 <a:ext uri="{91240B29-F687-4f45-9708-019B960494DF}">
-                  <a14:hiddenLine xmlns="" xmlns:a14="http://schemas.microsoft.com/office/drawing/2010/main" w="9525">
+                  <a14:hiddenLine xmlns:a14="http://schemas.microsoft.com/office/drawing/2010/main" xmlns="" w="9525">
                     <a:solidFill>
                       <a:srgbClr val="000000"/>
                     </a:solidFill>
@@ -10710,7 +10710,7 @@
               </a:ln>
               <a:extLst>
                 <a:ext uri="{91240B29-F687-4f45-9708-019B960494DF}">
-                  <a14:hiddenLine xmlns="" xmlns:a14="http://schemas.microsoft.com/office/drawing/2010/main" w="9525">
+                  <a14:hiddenLine xmlns:a14="http://schemas.microsoft.com/office/drawing/2010/main" xmlns="" w="9525">
                     <a:solidFill>
                       <a:srgbClr val="000000"/>
                     </a:solidFill>
@@ -10800,7 +10800,7 @@
               </a:ln>
               <a:extLst>
                 <a:ext uri="{91240B29-F687-4f45-9708-019B960494DF}">
-                  <a14:hiddenLine xmlns="" xmlns:a14="http://schemas.microsoft.com/office/drawing/2010/main" w="9525">
+                  <a14:hiddenLine xmlns:a14="http://schemas.microsoft.com/office/drawing/2010/main" xmlns="" w="9525">
                     <a:solidFill>
                       <a:srgbClr val="000000"/>
                     </a:solidFill>
@@ -10865,7 +10865,7 @@
               </a:ln>
               <a:extLst>
                 <a:ext uri="{91240B29-F687-4f45-9708-019B960494DF}">
-                  <a14:hiddenLine xmlns="" xmlns:a14="http://schemas.microsoft.com/office/drawing/2010/main" w="9525">
+                  <a14:hiddenLine xmlns:a14="http://schemas.microsoft.com/office/drawing/2010/main" xmlns="" w="9525">
                     <a:solidFill>
                       <a:srgbClr val="000000"/>
                     </a:solidFill>
@@ -10985,7 +10985,7 @@
               </a:ln>
               <a:extLst>
                 <a:ext uri="{91240B29-F687-4f45-9708-019B960494DF}">
-                  <a14:hiddenLine xmlns="" xmlns:a14="http://schemas.microsoft.com/office/drawing/2010/main" w="9525">
+                  <a14:hiddenLine xmlns:a14="http://schemas.microsoft.com/office/drawing/2010/main" xmlns="" w="9525">
                     <a:solidFill>
                       <a:srgbClr val="000000"/>
                     </a:solidFill>
@@ -11083,7 +11083,7 @@
               </a:ln>
               <a:extLst>
                 <a:ext uri="{91240B29-F687-4f45-9708-019B960494DF}">
-                  <a14:hiddenLine xmlns="" xmlns:a14="http://schemas.microsoft.com/office/drawing/2010/main" w="9525">
+                  <a14:hiddenLine xmlns:a14="http://schemas.microsoft.com/office/drawing/2010/main" xmlns="" w="9525">
                     <a:solidFill>
                       <a:srgbClr val="000000"/>
                     </a:solidFill>
@@ -11198,7 +11198,7 @@
               </a:ln>
               <a:extLst>
                 <a:ext uri="{91240B29-F687-4f45-9708-019B960494DF}">
-                  <a14:hiddenLine xmlns="" xmlns:a14="http://schemas.microsoft.com/office/drawing/2010/main" w="9525">
+                  <a14:hiddenLine xmlns:a14="http://schemas.microsoft.com/office/drawing/2010/main" xmlns="" w="9525">
                     <a:solidFill>
                       <a:srgbClr val="000000"/>
                     </a:solidFill>
@@ -11288,7 +11288,7 @@
               </a:ln>
               <a:extLst>
                 <a:ext uri="{91240B29-F687-4f45-9708-019B960494DF}">
-                  <a14:hiddenLine xmlns="" xmlns:a14="http://schemas.microsoft.com/office/drawing/2010/main" w="9525">
+                  <a14:hiddenLine xmlns:a14="http://schemas.microsoft.com/office/drawing/2010/main" xmlns="" w="9525">
                     <a:solidFill>
                       <a:srgbClr val="000000"/>
                     </a:solidFill>
@@ -11353,7 +11353,7 @@
               </a:ln>
               <a:extLst>
                 <a:ext uri="{91240B29-F687-4f45-9708-019B960494DF}">
-                  <a14:hiddenLine xmlns="" xmlns:a14="http://schemas.microsoft.com/office/drawing/2010/main" w="9525">
+                  <a14:hiddenLine xmlns:a14="http://schemas.microsoft.com/office/drawing/2010/main" xmlns="" w="9525">
                     <a:solidFill>
                       <a:srgbClr val="000000"/>
                     </a:solidFill>
@@ -11443,7 +11443,7 @@
               </a:ln>
               <a:extLst>
                 <a:ext uri="{91240B29-F687-4f45-9708-019B960494DF}">
-                  <a14:hiddenLine xmlns="" xmlns:a14="http://schemas.microsoft.com/office/drawing/2010/main" w="9525">
+                  <a14:hiddenLine xmlns:a14="http://schemas.microsoft.com/office/drawing/2010/main" xmlns="" w="9525">
                     <a:solidFill>
                       <a:srgbClr val="000000"/>
                     </a:solidFill>
@@ -11511,7 +11511,7 @@
               </a:ln>
               <a:extLst>
                 <a:ext uri="{91240B29-F687-4f45-9708-019B960494DF}">
-                  <a14:hiddenLine xmlns="" xmlns:a14="http://schemas.microsoft.com/office/drawing/2010/main" w="9525">
+                  <a14:hiddenLine xmlns:a14="http://schemas.microsoft.com/office/drawing/2010/main" xmlns="" w="9525">
                     <a:solidFill>
                       <a:srgbClr val="000000"/>
                     </a:solidFill>
@@ -11601,7 +11601,7 @@
               </a:ln>
               <a:extLst>
                 <a:ext uri="{91240B29-F687-4f45-9708-019B960494DF}">
-                  <a14:hiddenLine xmlns="" xmlns:a14="http://schemas.microsoft.com/office/drawing/2010/main" w="9525">
+                  <a14:hiddenLine xmlns:a14="http://schemas.microsoft.com/office/drawing/2010/main" xmlns="" w="9525">
                     <a:solidFill>
                       <a:srgbClr val="000000"/>
                     </a:solidFill>
@@ -11669,7 +11669,7 @@
               </a:ln>
               <a:extLst>
                 <a:ext uri="{91240B29-F687-4f45-9708-019B960494DF}">
-                  <a14:hiddenLine xmlns="" xmlns:a14="http://schemas.microsoft.com/office/drawing/2010/main" w="9525">
+                  <a14:hiddenLine xmlns:a14="http://schemas.microsoft.com/office/drawing/2010/main" xmlns="" w="9525">
                     <a:solidFill>
                       <a:srgbClr val="000000"/>
                     </a:solidFill>
@@ -11759,7 +11759,7 @@
               </a:ln>
               <a:extLst>
                 <a:ext uri="{91240B29-F687-4f45-9708-019B960494DF}">
-                  <a14:hiddenLine xmlns="" xmlns:a14="http://schemas.microsoft.com/office/drawing/2010/main" w="9525">
+                  <a14:hiddenLine xmlns:a14="http://schemas.microsoft.com/office/drawing/2010/main" xmlns="" w="9525">
                     <a:solidFill>
                       <a:srgbClr val="000000"/>
                     </a:solidFill>
@@ -11793,7 +11793,7 @@
               </a:ln>
               <a:extLst>
                 <a:ext uri="{91240B29-F687-4f45-9708-019B960494DF}">
-                  <a14:hiddenLine xmlns="" xmlns:a14="http://schemas.microsoft.com/office/drawing/2010/main" w="9525">
+                  <a14:hiddenLine xmlns:a14="http://schemas.microsoft.com/office/drawing/2010/main" xmlns="" w="9525">
                     <a:solidFill>
                       <a:srgbClr val="000000"/>
                     </a:solidFill>
@@ -12570,16 +12570,15 @@
           <a:lstStyle/>
           <a:p>
             <a:r>
-              <a:rPr lang="de-DE"/>
-              <a:t>Website Prototyp</a:t>
+              <a:rPr lang="de-DE" dirty="0"/>
+              <a:t>Prototyp</a:t>
             </a:r>
           </a:p>
           <a:p>
             <a:r>
-              <a:rPr lang="de-DE"/>
+              <a:rPr lang="de-DE" dirty="0"/>
               <a:t>Usability Tests</a:t>
             </a:r>
-            <a:endParaRPr lang="de-DE" dirty="0"/>
           </a:p>
         </p:txBody>
       </p:sp>
@@ -12746,7 +12745,7 @@
           <a:noFill/>
           <a:extLst>
             <a:ext uri="{909E8E84-426E-40dd-AFC4-6F175D3DCCD1}">
-              <a14:hiddenFill xmlns="" xmlns:a16="http://schemas.microsoft.com/office/drawing/2014/main" xmlns:p14="http://schemas.microsoft.com/office/powerpoint/2010/main" xmlns:a14="http://schemas.microsoft.com/office/drawing/2010/main">
+              <a14:hiddenFill xmlns:a14="http://schemas.microsoft.com/office/drawing/2010/main" xmlns:p14="http://schemas.microsoft.com/office/powerpoint/2010/main" xmlns:a16="http://schemas.microsoft.com/office/drawing/2014/main" xmlns="">
                 <a:solidFill>
                   <a:srgbClr val="FFFFFF"/>
                 </a:solidFill>
@@ -12840,58 +12839,35 @@
             </a:r>
             <a:endParaRPr lang="en-US" sz="2000" dirty="0"/>
           </a:p>
+          <a:p>
+            <a:endParaRPr lang="en-US" sz="2000" dirty="0"/>
+          </a:p>
+          <a:p>
+            <a:endParaRPr lang="en-US" sz="2000" dirty="0"/>
+          </a:p>
+          <a:p>
+            <a:endParaRPr lang="en-US" sz="2000" dirty="0"/>
+          </a:p>
+          <a:p>
+            <a:endParaRPr lang="en-US" sz="2000" dirty="0"/>
+          </a:p>
+          <a:p>
+            <a:r>
+              <a:rPr lang="en-US" sz="2000" dirty="0" err="1"/>
+              <a:t>Scrollbarkeit</a:t>
+            </a:r>
+            <a:r>
+              <a:rPr lang="en-US" sz="2000" dirty="0"/>
+              <a:t> </a:t>
+            </a:r>
+            <a:r>
+              <a:rPr lang="en-US" sz="2000" dirty="0" err="1"/>
+              <a:t>verdeutlichen</a:t>
+            </a:r>
+            <a:endParaRPr lang="en-US" sz="2000" dirty="0"/>
+          </a:p>
         </p:txBody>
       </p:sp>
-      <p:pic>
-        <p:nvPicPr>
-          <p:cNvPr id="8" name="Inhaltsplatzhalter 4">
-            <a:extLst>
-              <a:ext uri="{FF2B5EF4-FFF2-40B4-BE49-F238E27FC236}">
-                <a16:creationId xmlns:a16="http://schemas.microsoft.com/office/drawing/2014/main" id="{D2E8BC4D-B87A-4894-B4BA-6B1C093E741C}"/>
-              </a:ext>
-            </a:extLst>
-          </p:cNvPr>
-          <p:cNvPicPr>
-            <a:picLocks noChangeAspect="1"/>
-          </p:cNvPicPr>
-          <p:nvPr/>
-        </p:nvPicPr>
-        <p:blipFill>
-          <a:blip r:embed="rId4"/>
-          <a:stretch>
-            <a:fillRect/>
-          </a:stretch>
-        </p:blipFill>
-        <p:spPr>
-          <a:xfrm>
-            <a:off x="6096000" y="1896269"/>
-            <a:ext cx="5456279" cy="1855134"/>
-          </a:xfrm>
-          <a:prstGeom prst="round2DiagRect">
-            <a:avLst>
-              <a:gd name="adj1" fmla="val 5608"/>
-              <a:gd name="adj2" fmla="val 0"/>
-            </a:avLst>
-          </a:prstGeom>
-          <a:ln w="19050" cap="sq">
-            <a:solidFill>
-              <a:schemeClr val="tx2">
-                <a:lumMod val="60000"/>
-                <a:lumOff val="40000"/>
-                <a:alpha val="60000"/>
-              </a:schemeClr>
-            </a:solidFill>
-            <a:miter lim="800000"/>
-          </a:ln>
-          <a:effectLst>
-            <a:outerShdw blurRad="88900" dist="38100" dir="5400000" algn="t" rotWithShape="0">
-              <a:prstClr val="black">
-                <a:alpha val="40000"/>
-              </a:prstClr>
-            </a:outerShdw>
-          </a:effectLst>
-        </p:spPr>
-      </p:pic>
       <p:grpSp>
         <p:nvGrpSpPr>
           <p:cNvPr id="17" name="Group 16">
@@ -12975,7 +12951,7 @@
             </a:ln>
             <a:extLst>
               <a:ext uri="{91240B29-F687-4f45-9708-019B960494DF}">
-                <a14:hiddenLine xmlns="" xmlns:a16="http://schemas.microsoft.com/office/drawing/2014/main" xmlns:p14="http://schemas.microsoft.com/office/powerpoint/2010/main" xmlns:a14="http://schemas.microsoft.com/office/drawing/2010/main" w="9525">
+                <a14:hiddenLine xmlns:a14="http://schemas.microsoft.com/office/drawing/2010/main" xmlns:p14="http://schemas.microsoft.com/office/powerpoint/2010/main" xmlns:a16="http://schemas.microsoft.com/office/drawing/2014/main" xmlns="" w="9525">
                   <a:solidFill>
                     <a:srgbClr val="000000"/>
                   </a:solidFill>
@@ -13080,7 +13056,7 @@
             </a:ln>
             <a:extLst>
               <a:ext uri="{91240B29-F687-4f45-9708-019B960494DF}">
-                <a14:hiddenLine xmlns="" xmlns:a16="http://schemas.microsoft.com/office/drawing/2014/main" xmlns:p14="http://schemas.microsoft.com/office/powerpoint/2010/main" xmlns:a14="http://schemas.microsoft.com/office/drawing/2010/main" w="9525">
+                <a14:hiddenLine xmlns:a14="http://schemas.microsoft.com/office/drawing/2010/main" xmlns:p14="http://schemas.microsoft.com/office/powerpoint/2010/main" xmlns:a16="http://schemas.microsoft.com/office/drawing/2014/main" xmlns="" w="9525">
                   <a:solidFill>
                     <a:srgbClr val="000000"/>
                   </a:solidFill>
@@ -13185,7 +13161,7 @@
             </a:ln>
             <a:extLst>
               <a:ext uri="{91240B29-F687-4f45-9708-019B960494DF}">
-                <a14:hiddenLine xmlns="" xmlns:a16="http://schemas.microsoft.com/office/drawing/2014/main" xmlns:p14="http://schemas.microsoft.com/office/powerpoint/2010/main" xmlns:a14="http://schemas.microsoft.com/office/drawing/2010/main" w="9525">
+                <a14:hiddenLine xmlns:a14="http://schemas.microsoft.com/office/drawing/2010/main" xmlns:p14="http://schemas.microsoft.com/office/powerpoint/2010/main" xmlns:a16="http://schemas.microsoft.com/office/drawing/2014/main" xmlns="" w="9525">
                   <a:solidFill>
                     <a:srgbClr val="000000"/>
                   </a:solidFill>
@@ -13262,7 +13238,7 @@
             </a:ln>
             <a:extLst>
               <a:ext uri="{91240B29-F687-4f45-9708-019B960494DF}">
-                <a14:hiddenLine xmlns="" xmlns:a16="http://schemas.microsoft.com/office/drawing/2014/main" xmlns:p14="http://schemas.microsoft.com/office/powerpoint/2010/main" xmlns:a14="http://schemas.microsoft.com/office/drawing/2010/main" w="9525">
+                <a14:hiddenLine xmlns:a14="http://schemas.microsoft.com/office/drawing/2010/main" xmlns:p14="http://schemas.microsoft.com/office/powerpoint/2010/main" xmlns:a16="http://schemas.microsoft.com/office/drawing/2014/main" xmlns="" w="9525">
                   <a:solidFill>
                     <a:srgbClr val="000000"/>
                   </a:solidFill>
@@ -13367,7 +13343,7 @@
             </a:ln>
             <a:extLst>
               <a:ext uri="{91240B29-F687-4f45-9708-019B960494DF}">
-                <a14:hiddenLine xmlns="" xmlns:a16="http://schemas.microsoft.com/office/drawing/2014/main" xmlns:p14="http://schemas.microsoft.com/office/powerpoint/2010/main" xmlns:a14="http://schemas.microsoft.com/office/drawing/2010/main" w="9525">
+                <a14:hiddenLine xmlns:a14="http://schemas.microsoft.com/office/drawing/2010/main" xmlns:p14="http://schemas.microsoft.com/office/powerpoint/2010/main" xmlns:a16="http://schemas.microsoft.com/office/drawing/2014/main" xmlns="" w="9525">
                   <a:solidFill>
                     <a:srgbClr val="000000"/>
                   </a:solidFill>
@@ -13444,7 +13420,7 @@
             </a:ln>
             <a:extLst>
               <a:ext uri="{91240B29-F687-4f45-9708-019B960494DF}">
-                <a14:hiddenLine xmlns="" xmlns:a16="http://schemas.microsoft.com/office/drawing/2014/main" xmlns:p14="http://schemas.microsoft.com/office/powerpoint/2010/main" xmlns:a14="http://schemas.microsoft.com/office/drawing/2010/main" w="9525">
+                <a14:hiddenLine xmlns:a14="http://schemas.microsoft.com/office/drawing/2010/main" xmlns:p14="http://schemas.microsoft.com/office/powerpoint/2010/main" xmlns:a16="http://schemas.microsoft.com/office/drawing/2014/main" xmlns="" w="9525">
                   <a:solidFill>
                     <a:srgbClr val="000000"/>
                   </a:solidFill>
@@ -13521,7 +13497,7 @@
             </a:ln>
             <a:extLst>
               <a:ext uri="{91240B29-F687-4f45-9708-019B960494DF}">
-                <a14:hiddenLine xmlns="" xmlns:a16="http://schemas.microsoft.com/office/drawing/2014/main" xmlns:p14="http://schemas.microsoft.com/office/powerpoint/2010/main" xmlns:a14="http://schemas.microsoft.com/office/drawing/2010/main" w="9525">
+                <a14:hiddenLine xmlns:a14="http://schemas.microsoft.com/office/drawing/2010/main" xmlns:p14="http://schemas.microsoft.com/office/powerpoint/2010/main" xmlns:a16="http://schemas.microsoft.com/office/drawing/2014/main" xmlns="" w="9525">
                   <a:solidFill>
                     <a:srgbClr val="000000"/>
                   </a:solidFill>
@@ -13626,7 +13602,7 @@
             </a:ln>
             <a:extLst>
               <a:ext uri="{91240B29-F687-4f45-9708-019B960494DF}">
-                <a14:hiddenLine xmlns="" xmlns:a16="http://schemas.microsoft.com/office/drawing/2014/main" xmlns:p14="http://schemas.microsoft.com/office/powerpoint/2010/main" xmlns:a14="http://schemas.microsoft.com/office/drawing/2010/main" w="9525">
+                <a14:hiddenLine xmlns:a14="http://schemas.microsoft.com/office/drawing/2010/main" xmlns:p14="http://schemas.microsoft.com/office/powerpoint/2010/main" xmlns:a16="http://schemas.microsoft.com/office/drawing/2014/main" xmlns="" w="9525">
                   <a:solidFill>
                     <a:srgbClr val="000000"/>
                   </a:solidFill>
@@ -13731,7 +13707,7 @@
             </a:ln>
             <a:extLst>
               <a:ext uri="{91240B29-F687-4f45-9708-019B960494DF}">
-                <a14:hiddenLine xmlns="" xmlns:a16="http://schemas.microsoft.com/office/drawing/2014/main" xmlns:p14="http://schemas.microsoft.com/office/powerpoint/2010/main" xmlns:a14="http://schemas.microsoft.com/office/drawing/2010/main" w="9525">
+                <a14:hiddenLine xmlns:a14="http://schemas.microsoft.com/office/drawing/2010/main" xmlns:p14="http://schemas.microsoft.com/office/powerpoint/2010/main" xmlns:a16="http://schemas.microsoft.com/office/drawing/2014/main" xmlns="" w="9525">
                   <a:solidFill>
                     <a:srgbClr val="000000"/>
                   </a:solidFill>
@@ -13808,7 +13784,7 @@
             </a:ln>
             <a:extLst>
               <a:ext uri="{91240B29-F687-4f45-9708-019B960494DF}">
-                <a14:hiddenLine xmlns="" xmlns:a16="http://schemas.microsoft.com/office/drawing/2014/main" xmlns:p14="http://schemas.microsoft.com/office/powerpoint/2010/main" xmlns:a14="http://schemas.microsoft.com/office/drawing/2010/main" w="9525">
+                <a14:hiddenLine xmlns:a14="http://schemas.microsoft.com/office/drawing/2010/main" xmlns:p14="http://schemas.microsoft.com/office/powerpoint/2010/main" xmlns:a16="http://schemas.microsoft.com/office/drawing/2014/main" xmlns="" w="9525">
                   <a:solidFill>
                     <a:srgbClr val="000000"/>
                   </a:solidFill>
@@ -13933,7 +13909,7 @@
             </a:ln>
             <a:extLst>
               <a:ext uri="{91240B29-F687-4f45-9708-019B960494DF}">
-                <a14:hiddenLine xmlns="" xmlns:a16="http://schemas.microsoft.com/office/drawing/2014/main" xmlns:p14="http://schemas.microsoft.com/office/powerpoint/2010/main" xmlns:a14="http://schemas.microsoft.com/office/drawing/2010/main" w="9525">
+                <a14:hiddenLine xmlns:a14="http://schemas.microsoft.com/office/drawing/2010/main" xmlns:p14="http://schemas.microsoft.com/office/powerpoint/2010/main" xmlns:a16="http://schemas.microsoft.com/office/drawing/2014/main" xmlns="" w="9525">
                   <a:solidFill>
                     <a:srgbClr val="000000"/>
                   </a:solidFill>
@@ -14047,7 +14023,7 @@
             </a:ln>
             <a:extLst>
               <a:ext uri="{91240B29-F687-4f45-9708-019B960494DF}">
-                <a14:hiddenLine xmlns="" xmlns:a16="http://schemas.microsoft.com/office/drawing/2014/main" xmlns:p14="http://schemas.microsoft.com/office/powerpoint/2010/main" xmlns:a14="http://schemas.microsoft.com/office/drawing/2010/main" w="9525">
+                <a14:hiddenLine xmlns:a14="http://schemas.microsoft.com/office/drawing/2010/main" xmlns:p14="http://schemas.microsoft.com/office/powerpoint/2010/main" xmlns:a16="http://schemas.microsoft.com/office/drawing/2014/main" xmlns="" w="9525">
                   <a:solidFill>
                     <a:srgbClr val="000000"/>
                   </a:solidFill>
@@ -14124,7 +14100,7 @@
             </a:ln>
             <a:extLst>
               <a:ext uri="{91240B29-F687-4f45-9708-019B960494DF}">
-                <a14:hiddenLine xmlns="" xmlns:a16="http://schemas.microsoft.com/office/drawing/2014/main" xmlns:p14="http://schemas.microsoft.com/office/powerpoint/2010/main" xmlns:a14="http://schemas.microsoft.com/office/drawing/2010/main" w="9525">
+                <a14:hiddenLine xmlns:a14="http://schemas.microsoft.com/office/drawing/2010/main" xmlns:p14="http://schemas.microsoft.com/office/powerpoint/2010/main" xmlns:a16="http://schemas.microsoft.com/office/drawing/2014/main" xmlns="" w="9525">
                   <a:solidFill>
                     <a:srgbClr val="000000"/>
                   </a:solidFill>
@@ -14201,7 +14177,7 @@
             </a:ln>
             <a:extLst>
               <a:ext uri="{91240B29-F687-4f45-9708-019B960494DF}">
-                <a14:hiddenLine xmlns="" xmlns:a16="http://schemas.microsoft.com/office/drawing/2014/main" xmlns:p14="http://schemas.microsoft.com/office/powerpoint/2010/main" xmlns:a14="http://schemas.microsoft.com/office/drawing/2010/main" w="9525">
+                <a14:hiddenLine xmlns:a14="http://schemas.microsoft.com/office/drawing/2010/main" xmlns:p14="http://schemas.microsoft.com/office/powerpoint/2010/main" xmlns:a16="http://schemas.microsoft.com/office/drawing/2014/main" xmlns="" w="9525">
                   <a:solidFill>
                     <a:srgbClr val="000000"/>
                   </a:solidFill>
@@ -14306,7 +14282,7 @@
             </a:ln>
             <a:extLst>
               <a:ext uri="{91240B29-F687-4f45-9708-019B960494DF}">
-                <a14:hiddenLine xmlns="" xmlns:a16="http://schemas.microsoft.com/office/drawing/2014/main" xmlns:p14="http://schemas.microsoft.com/office/powerpoint/2010/main" xmlns:a14="http://schemas.microsoft.com/office/drawing/2010/main" w="9525">
+                <a14:hiddenLine xmlns:a14="http://schemas.microsoft.com/office/drawing/2010/main" xmlns:p14="http://schemas.microsoft.com/office/powerpoint/2010/main" xmlns:a16="http://schemas.microsoft.com/office/drawing/2014/main" xmlns="" w="9525">
                   <a:solidFill>
                     <a:srgbClr val="000000"/>
                   </a:solidFill>
@@ -14355,7 +14331,7 @@
             </a:ln>
             <a:extLst>
               <a:ext uri="{91240B29-F687-4f45-9708-019B960494DF}">
-                <a14:hiddenLine xmlns="" xmlns:a16="http://schemas.microsoft.com/office/drawing/2014/main" xmlns:p14="http://schemas.microsoft.com/office/powerpoint/2010/main" xmlns:a14="http://schemas.microsoft.com/office/drawing/2010/main" w="9525">
+                <a14:hiddenLine xmlns:a14="http://schemas.microsoft.com/office/drawing/2010/main" xmlns:p14="http://schemas.microsoft.com/office/powerpoint/2010/main" xmlns:a16="http://schemas.microsoft.com/office/drawing/2014/main" xmlns="" w="9525">
                   <a:solidFill>
                     <a:srgbClr val="000000"/>
                   </a:solidFill>
@@ -14435,7 +14411,7 @@
             </a:ln>
             <a:extLst>
               <a:ext uri="{91240B29-F687-4f45-9708-019B960494DF}">
-                <a14:hiddenLine xmlns="" xmlns:a16="http://schemas.microsoft.com/office/drawing/2014/main" xmlns:p14="http://schemas.microsoft.com/office/powerpoint/2010/main" xmlns:a14="http://schemas.microsoft.com/office/drawing/2010/main" w="9525">
+                <a14:hiddenLine xmlns:a14="http://schemas.microsoft.com/office/drawing/2010/main" xmlns:p14="http://schemas.microsoft.com/office/powerpoint/2010/main" xmlns:a16="http://schemas.microsoft.com/office/drawing/2014/main" xmlns="" w="9525">
                   <a:solidFill>
                     <a:srgbClr val="000000"/>
                   </a:solidFill>
@@ -14540,7 +14516,7 @@
             </a:ln>
             <a:extLst>
               <a:ext uri="{91240B29-F687-4f45-9708-019B960494DF}">
-                <a14:hiddenLine xmlns="" xmlns:a16="http://schemas.microsoft.com/office/drawing/2014/main" xmlns:p14="http://schemas.microsoft.com/office/powerpoint/2010/main" xmlns:a14="http://schemas.microsoft.com/office/drawing/2010/main" w="9525">
+                <a14:hiddenLine xmlns:a14="http://schemas.microsoft.com/office/drawing/2010/main" xmlns:p14="http://schemas.microsoft.com/office/powerpoint/2010/main" xmlns:a16="http://schemas.microsoft.com/office/drawing/2014/main" xmlns="" w="9525">
                   <a:solidFill>
                     <a:srgbClr val="000000"/>
                   </a:solidFill>
@@ -14617,7 +14593,7 @@
             </a:ln>
             <a:extLst>
               <a:ext uri="{91240B29-F687-4f45-9708-019B960494DF}">
-                <a14:hiddenLine xmlns="" xmlns:a16="http://schemas.microsoft.com/office/drawing/2014/main" xmlns:p14="http://schemas.microsoft.com/office/powerpoint/2010/main" xmlns:a14="http://schemas.microsoft.com/office/drawing/2010/main" w="9525">
+                <a14:hiddenLine xmlns:a14="http://schemas.microsoft.com/office/drawing/2010/main" xmlns:p14="http://schemas.microsoft.com/office/powerpoint/2010/main" xmlns:a16="http://schemas.microsoft.com/office/drawing/2014/main" xmlns="" w="9525">
                   <a:solidFill>
                     <a:srgbClr val="000000"/>
                   </a:solidFill>
@@ -14722,7 +14698,7 @@
             </a:ln>
             <a:extLst>
               <a:ext uri="{91240B29-F687-4f45-9708-019B960494DF}">
-                <a14:hiddenLine xmlns="" xmlns:a16="http://schemas.microsoft.com/office/drawing/2014/main" xmlns:p14="http://schemas.microsoft.com/office/powerpoint/2010/main" xmlns:a14="http://schemas.microsoft.com/office/drawing/2010/main" w="9525">
+                <a14:hiddenLine xmlns:a14="http://schemas.microsoft.com/office/drawing/2010/main" xmlns:p14="http://schemas.microsoft.com/office/powerpoint/2010/main" xmlns:a16="http://schemas.microsoft.com/office/drawing/2014/main" xmlns="" w="9525">
                   <a:solidFill>
                     <a:srgbClr val="000000"/>
                   </a:solidFill>
@@ -14802,7 +14778,7 @@
             </a:ln>
             <a:extLst>
               <a:ext uri="{91240B29-F687-4f45-9708-019B960494DF}">
-                <a14:hiddenLine xmlns="" xmlns:a16="http://schemas.microsoft.com/office/drawing/2014/main" xmlns:p14="http://schemas.microsoft.com/office/powerpoint/2010/main" xmlns:a14="http://schemas.microsoft.com/office/drawing/2010/main" w="9525">
+                <a14:hiddenLine xmlns:a14="http://schemas.microsoft.com/office/drawing/2010/main" xmlns:p14="http://schemas.microsoft.com/office/powerpoint/2010/main" xmlns:a16="http://schemas.microsoft.com/office/drawing/2014/main" xmlns="" w="9525">
                   <a:solidFill>
                     <a:srgbClr val="000000"/>
                   </a:solidFill>
@@ -14879,7 +14855,7 @@
             </a:ln>
             <a:extLst>
               <a:ext uri="{91240B29-F687-4f45-9708-019B960494DF}">
-                <a14:hiddenLine xmlns="" xmlns:a16="http://schemas.microsoft.com/office/drawing/2014/main" xmlns:p14="http://schemas.microsoft.com/office/powerpoint/2010/main" xmlns:a14="http://schemas.microsoft.com/office/drawing/2010/main" w="9525">
+                <a14:hiddenLine xmlns:a14="http://schemas.microsoft.com/office/drawing/2010/main" xmlns:p14="http://schemas.microsoft.com/office/powerpoint/2010/main" xmlns:a16="http://schemas.microsoft.com/office/drawing/2014/main" xmlns="" w="9525">
                   <a:solidFill>
                     <a:srgbClr val="000000"/>
                   </a:solidFill>
@@ -14984,7 +14960,7 @@
             </a:ln>
             <a:extLst>
               <a:ext uri="{91240B29-F687-4f45-9708-019B960494DF}">
-                <a14:hiddenLine xmlns="" xmlns:a16="http://schemas.microsoft.com/office/drawing/2014/main" xmlns:p14="http://schemas.microsoft.com/office/powerpoint/2010/main" xmlns:a14="http://schemas.microsoft.com/office/drawing/2010/main" w="9525">
+                <a14:hiddenLine xmlns:a14="http://schemas.microsoft.com/office/drawing/2010/main" xmlns:p14="http://schemas.microsoft.com/office/powerpoint/2010/main" xmlns:a16="http://schemas.microsoft.com/office/drawing/2014/main" xmlns="" w="9525">
                   <a:solidFill>
                     <a:srgbClr val="000000"/>
                   </a:solidFill>
@@ -15089,7 +15065,7 @@
             </a:ln>
             <a:extLst>
               <a:ext uri="{91240B29-F687-4f45-9708-019B960494DF}">
-                <a14:hiddenLine xmlns="" xmlns:a16="http://schemas.microsoft.com/office/drawing/2014/main" xmlns:p14="http://schemas.microsoft.com/office/powerpoint/2010/main" xmlns:a14="http://schemas.microsoft.com/office/drawing/2010/main" w="9525">
+                <a14:hiddenLine xmlns:a14="http://schemas.microsoft.com/office/drawing/2010/main" xmlns:p14="http://schemas.microsoft.com/office/powerpoint/2010/main" xmlns:a16="http://schemas.microsoft.com/office/drawing/2014/main" xmlns="" w="9525">
                   <a:solidFill>
                     <a:srgbClr val="000000"/>
                   </a:solidFill>
@@ -15169,7 +15145,7 @@
             </a:ln>
             <a:extLst>
               <a:ext uri="{91240B29-F687-4f45-9708-019B960494DF}">
-                <a14:hiddenLine xmlns="" xmlns:a16="http://schemas.microsoft.com/office/drawing/2014/main" xmlns:p14="http://schemas.microsoft.com/office/powerpoint/2010/main" xmlns:a14="http://schemas.microsoft.com/office/drawing/2010/main" w="9525">
+                <a14:hiddenLine xmlns:a14="http://schemas.microsoft.com/office/drawing/2010/main" xmlns:p14="http://schemas.microsoft.com/office/powerpoint/2010/main" xmlns:a16="http://schemas.microsoft.com/office/drawing/2014/main" xmlns="" w="9525">
                   <a:solidFill>
                     <a:srgbClr val="000000"/>
                   </a:solidFill>
@@ -15304,7 +15280,7 @@
             </a:ln>
             <a:extLst>
               <a:ext uri="{91240B29-F687-4f45-9708-019B960494DF}">
-                <a14:hiddenLine xmlns="" xmlns:a16="http://schemas.microsoft.com/office/drawing/2014/main" xmlns:p14="http://schemas.microsoft.com/office/powerpoint/2010/main" xmlns:a14="http://schemas.microsoft.com/office/drawing/2010/main" w="9525">
+                <a14:hiddenLine xmlns:a14="http://schemas.microsoft.com/office/drawing/2010/main" xmlns:p14="http://schemas.microsoft.com/office/powerpoint/2010/main" xmlns:a16="http://schemas.microsoft.com/office/drawing/2014/main" xmlns="" w="9525">
                   <a:solidFill>
                     <a:srgbClr val="000000"/>
                   </a:solidFill>
@@ -15317,6 +15293,66 @@
           </p:spPr>
         </p:sp>
       </p:grpSp>
+      <p:pic>
+        <p:nvPicPr>
+          <p:cNvPr id="4" name="Grafik 3">
+            <a:extLst>
+              <a:ext uri="{FF2B5EF4-FFF2-40B4-BE49-F238E27FC236}">
+                <a16:creationId xmlns:a16="http://schemas.microsoft.com/office/drawing/2014/main" id="{75CA8A08-5AD6-40FE-8DEB-521B4C88AEB9}"/>
+              </a:ext>
+            </a:extLst>
+          </p:cNvPr>
+          <p:cNvPicPr>
+            <a:picLocks noChangeAspect="1"/>
+          </p:cNvPicPr>
+          <p:nvPr/>
+        </p:nvPicPr>
+        <p:blipFill>
+          <a:blip r:embed="rId4"/>
+          <a:stretch>
+            <a:fillRect/>
+          </a:stretch>
+        </p:blipFill>
+        <p:spPr>
+          <a:xfrm>
+            <a:off x="5834817" y="1853454"/>
+            <a:ext cx="5707264" cy="1570342"/>
+          </a:xfrm>
+          <a:prstGeom prst="rect">
+            <a:avLst/>
+          </a:prstGeom>
+        </p:spPr>
+      </p:pic>
+      <p:pic>
+        <p:nvPicPr>
+          <p:cNvPr id="6" name="Grafik 5">
+            <a:extLst>
+              <a:ext uri="{FF2B5EF4-FFF2-40B4-BE49-F238E27FC236}">
+                <a16:creationId xmlns:a16="http://schemas.microsoft.com/office/drawing/2014/main" id="{FCEC72D0-CF28-44B6-8556-24C14DB104B1}"/>
+              </a:ext>
+            </a:extLst>
+          </p:cNvPr>
+          <p:cNvPicPr>
+            <a:picLocks noChangeAspect="1"/>
+          </p:cNvPicPr>
+          <p:nvPr/>
+        </p:nvPicPr>
+        <p:blipFill>
+          <a:blip r:embed="rId5"/>
+          <a:stretch>
+            <a:fillRect/>
+          </a:stretch>
+        </p:blipFill>
+        <p:spPr>
+          <a:xfrm>
+            <a:off x="5924548" y="3801045"/>
+            <a:ext cx="5527802" cy="2679706"/>
+          </a:xfrm>
+          <a:prstGeom prst="rect">
+            <a:avLst/>
+          </a:prstGeom>
+        </p:spPr>
+      </p:pic>
     </p:spTree>
     <p:extLst>
       <p:ext uri="{BB962C8B-B14F-4D97-AF65-F5344CB8AC3E}">

</xml_diff>